<commit_message>
changes to font in CSS
</commit_message>
<xml_diff>
--- a/Project 1 Presentation.pptx
+++ b/Project 1 Presentation.pptx
@@ -6,12 +6,13 @@
   </p:sldMasterIdLst>
   <p:sldIdLst>
     <p:sldId id="256" r:id="rId2"/>
-    <p:sldId id="257" r:id="rId3"/>
-    <p:sldId id="261" r:id="rId4"/>
-    <p:sldId id="262" r:id="rId5"/>
-    <p:sldId id="258" r:id="rId6"/>
-    <p:sldId id="259" r:id="rId7"/>
-    <p:sldId id="260" r:id="rId8"/>
+    <p:sldId id="263" r:id="rId3"/>
+    <p:sldId id="257" r:id="rId4"/>
+    <p:sldId id="261" r:id="rId5"/>
+    <p:sldId id="262" r:id="rId6"/>
+    <p:sldId id="258" r:id="rId7"/>
+    <p:sldId id="259" r:id="rId8"/>
+    <p:sldId id="260" r:id="rId9"/>
   </p:sldIdLst>
   <p:sldSz cx="9144000" cy="6858000" type="screen4x3"/>
   <p:notesSz cx="6858000" cy="9144000"/>
@@ -301,7 +302,7 @@
           <a:p>
             <a:fld id="{C8A432C8-69A7-458B-9684-2BFA64B31948}" type="datetime2">
               <a:rPr lang="en-US" smtClean="0"/>
-              <a:t>Sunday, April 23, 17</a:t>
+              <a:t>Tuesday, April 25, 17</a:t>
             </a:fld>
             <a:endParaRPr lang="en-US"/>
           </a:p>
@@ -503,7 +504,7 @@
           <a:p>
             <a:fld id="{8CC057FC-95B6-4D89-AFDA-ABA33EE921E5}" type="datetime2">
               <a:rPr lang="en-US" smtClean="0"/>
-              <a:t>Sunday, April 23, 17</a:t>
+              <a:t>Tuesday, April 25, 17</a:t>
             </a:fld>
             <a:endParaRPr lang="en-US"/>
           </a:p>
@@ -680,7 +681,7 @@
           <a:p>
             <a:fld id="{EC4549AC-EB31-477F-92A9-B1988E232878}" type="datetime2">
               <a:rPr lang="en-US" smtClean="0"/>
-              <a:t>Sunday, April 23, 17</a:t>
+              <a:t>Tuesday, April 25, 17</a:t>
             </a:fld>
             <a:endParaRPr lang="en-US"/>
           </a:p>
@@ -847,7 +848,7 @@
           <a:p>
             <a:fld id="{6396A3A3-94A6-4E5B-AF39-173ACA3E61CC}" type="datetime2">
               <a:rPr lang="en-US" smtClean="0"/>
-              <a:t>Sunday, April 23, 17</a:t>
+              <a:t>Tuesday, April 25, 17</a:t>
             </a:fld>
             <a:endParaRPr lang="en-US"/>
           </a:p>
@@ -1097,7 +1098,7 @@
           <a:p>
             <a:fld id="{9933D019-A32C-4EAD-B8E6-DBDA699692FD}" type="datetime2">
               <a:rPr lang="en-US" smtClean="0"/>
-              <a:t>Sunday, April 23, 17</a:t>
+              <a:t>Tuesday, April 25, 17</a:t>
             </a:fld>
             <a:endParaRPr lang="en-US"/>
           </a:p>
@@ -1417,7 +1418,7 @@
           <a:p>
             <a:fld id="{CCEBA98F-560C-4997-81C4-81D4D9187EAB}" type="datetime2">
               <a:rPr lang="en-US" smtClean="0"/>
-              <a:t>Sunday, April 23, 17</a:t>
+              <a:t>Tuesday, April 25, 17</a:t>
             </a:fld>
             <a:endParaRPr lang="en-US"/>
           </a:p>
@@ -1885,7 +1886,7 @@
           <a:p>
             <a:fld id="{150972B2-CA5C-437D-87D0-8081271A9E4B}" type="datetime2">
               <a:rPr lang="en-US" smtClean="0"/>
-              <a:t>Sunday, April 23, 17</a:t>
+              <a:t>Tuesday, April 25, 17</a:t>
             </a:fld>
             <a:endParaRPr lang="en-US"/>
           </a:p>
@@ -2035,7 +2036,7 @@
           <a:p>
             <a:fld id="{79CD4847-11EF-4466-A8AD-85CDB7B49118}" type="datetime2">
               <a:rPr lang="en-US" smtClean="0"/>
-              <a:t>Sunday, April 23, 17</a:t>
+              <a:t>Tuesday, April 25, 17</a:t>
             </a:fld>
             <a:endParaRPr lang="en-US"/>
           </a:p>
@@ -2127,7 +2128,7 @@
           <a:p>
             <a:fld id="{F168457A-3AB9-4880-8A0C-9F8524491207}" type="datetime2">
               <a:rPr lang="en-US" smtClean="0"/>
-              <a:t>Sunday, April 23, 17</a:t>
+              <a:t>Tuesday, April 25, 17</a:t>
             </a:fld>
             <a:endParaRPr lang="en-US"/>
           </a:p>
@@ -2403,7 +2404,7 @@
           <a:p>
             <a:fld id="{3FE976D3-5B7F-4300-ABED-C91F1B2AE209}" type="datetime2">
               <a:rPr lang="en-US" smtClean="0"/>
-              <a:t>Sunday, April 23, 17</a:t>
+              <a:t>Tuesday, April 25, 17</a:t>
             </a:fld>
             <a:endParaRPr lang="en-US"/>
           </a:p>
@@ -2710,7 +2711,7 @@
           <a:p>
             <a:fld id="{EBDC1E59-17DD-41CE-97CA-624A472382D4}" type="datetime2">
               <a:rPr lang="en-US" smtClean="0"/>
-              <a:t>Sunday, April 23, 17</a:t>
+              <a:t>Tuesday, April 25, 17</a:t>
             </a:fld>
             <a:endParaRPr lang="en-US"/>
           </a:p>
@@ -3010,7 +3011,7 @@
           <a:p>
             <a:fld id="{A80CB818-7379-467D-8E76-EF9D9074A26C}" type="datetime2">
               <a:rPr lang="en-US" smtClean="0"/>
-              <a:t>Sunday, April 23, 17</a:t>
+              <a:t>Tuesday, April 25, 17</a:t>
             </a:fld>
             <a:endParaRPr lang="en-US" dirty="0"/>
           </a:p>
@@ -3783,6 +3784,85 @@
           <a:bodyPr/>
           <a:lstStyle/>
           <a:p>
+            <a:endParaRPr lang="en-US"/>
+          </a:p>
+        </p:txBody>
+      </p:sp>
+      <p:pic>
+        <p:nvPicPr>
+          <p:cNvPr id="6" name="Content Placeholder 5" descr="Screen Shot 2017-04-25 at 9.25.08 AM.png"/>
+          <p:cNvPicPr>
+            <a:picLocks noGrp="1" noChangeAspect="1"/>
+          </p:cNvPicPr>
+          <p:nvPr>
+            <p:ph idx="1"/>
+          </p:nvPr>
+        </p:nvPicPr>
+        <p:blipFill>
+          <a:blip r:embed="rId2">
+            <a:extLst>
+              <a:ext uri="{28A0092B-C50C-407E-A947-70E740481C1C}">
+                <a14:useLocalDpi xmlns:a14="http://schemas.microsoft.com/office/drawing/2010/main" val="0"/>
+              </a:ext>
+            </a:extLst>
+          </a:blip>
+          <a:srcRect t="5461" b="5461"/>
+          <a:stretch>
+            <a:fillRect/>
+          </a:stretch>
+        </p:blipFill>
+        <p:spPr>
+          <a:xfrm>
+            <a:off x="1749131" y="2143228"/>
+            <a:ext cx="5482566" cy="3248928"/>
+          </a:xfrm>
+        </p:spPr>
+      </p:pic>
+    </p:spTree>
+    <p:extLst>
+      <p:ext uri="{BB962C8B-B14F-4D97-AF65-F5344CB8AC3E}">
+        <p14:creationId xmlns:p14="http://schemas.microsoft.com/office/powerpoint/2010/main" val="2821990875"/>
+      </p:ext>
+    </p:extLst>
+  </p:cSld>
+  <p:clrMapOvr>
+    <a:masterClrMapping/>
+  </p:clrMapOvr>
+</p:sld>
+</file>
+
+<file path=ppt/slides/slide3.xml><?xml version="1.0" encoding="utf-8"?>
+<p:sld xmlns:a="http://schemas.openxmlformats.org/drawingml/2006/main" xmlns:r="http://schemas.openxmlformats.org/officeDocument/2006/relationships" xmlns:p="http://schemas.openxmlformats.org/presentationml/2006/main">
+  <p:cSld>
+    <p:spTree>
+      <p:nvGrpSpPr>
+        <p:cNvPr id="1" name=""/>
+        <p:cNvGrpSpPr/>
+        <p:nvPr/>
+      </p:nvGrpSpPr>
+      <p:grpSpPr>
+        <a:xfrm>
+          <a:off x="0" y="0"/>
+          <a:ext cx="0" cy="0"/>
+          <a:chOff x="0" y="0"/>
+          <a:chExt cx="0" cy="0"/>
+        </a:xfrm>
+      </p:grpSpPr>
+      <p:sp>
+        <p:nvSpPr>
+          <p:cNvPr id="2" name="Title 1"/>
+          <p:cNvSpPr>
+            <a:spLocks noGrp="1"/>
+          </p:cNvSpPr>
+          <p:nvPr>
+            <p:ph type="title"/>
+          </p:nvPr>
+        </p:nvSpPr>
+        <p:spPr/>
+        <p:txBody>
+          <a:bodyPr/>
+          <a:lstStyle/>
+          <a:p>
             <a:r>
               <a:rPr lang="en-US" dirty="0" smtClean="0"/>
               <a:t>WIREFRAMES: Main Page</a:t>
@@ -3829,7 +3909,7 @@
 </p:sld>
 </file>
 
-<file path=ppt/slides/slide3.xml><?xml version="1.0" encoding="utf-8"?>
+<file path=ppt/slides/slide4.xml><?xml version="1.0" encoding="utf-8"?>
 <p:sld xmlns:a="http://schemas.openxmlformats.org/drawingml/2006/main" xmlns:r="http://schemas.openxmlformats.org/officeDocument/2006/relationships" xmlns:p="http://schemas.openxmlformats.org/presentationml/2006/main">
   <p:cSld>
     <p:spTree>
@@ -3912,84 +3992,6 @@
 </p:sld>
 </file>
 
-<file path=ppt/slides/slide4.xml><?xml version="1.0" encoding="utf-8"?>
-<p:sld xmlns:a="http://schemas.openxmlformats.org/drawingml/2006/main" xmlns:r="http://schemas.openxmlformats.org/officeDocument/2006/relationships" xmlns:p="http://schemas.openxmlformats.org/presentationml/2006/main">
-  <p:cSld>
-    <p:spTree>
-      <p:nvGrpSpPr>
-        <p:cNvPr id="1" name=""/>
-        <p:cNvGrpSpPr/>
-        <p:nvPr/>
-      </p:nvGrpSpPr>
-      <p:grpSpPr>
-        <a:xfrm>
-          <a:off x="0" y="0"/>
-          <a:ext cx="0" cy="0"/>
-          <a:chOff x="0" y="0"/>
-          <a:chExt cx="0" cy="0"/>
-        </a:xfrm>
-      </p:grpSpPr>
-      <p:sp>
-        <p:nvSpPr>
-          <p:cNvPr id="2" name="Title 1"/>
-          <p:cNvSpPr>
-            <a:spLocks noGrp="1"/>
-          </p:cNvSpPr>
-          <p:nvPr>
-            <p:ph type="title"/>
-          </p:nvPr>
-        </p:nvSpPr>
-        <p:spPr/>
-        <p:txBody>
-          <a:bodyPr/>
-          <a:lstStyle/>
-          <a:p>
-            <a:r>
-              <a:rPr lang="en-US" dirty="0" smtClean="0"/>
-              <a:t>WIREFRAMES: Brands Page</a:t>
-            </a:r>
-            <a:endParaRPr lang="en-US" dirty="0"/>
-          </a:p>
-        </p:txBody>
-      </p:sp>
-      <p:pic>
-        <p:nvPicPr>
-          <p:cNvPr id="4" name="Content Placeholder 3" descr="Sneakerhub_WireframeBrands.pdf"/>
-          <p:cNvPicPr>
-            <a:picLocks noGrp="1" noChangeAspect="1"/>
-          </p:cNvPicPr>
-          <p:nvPr>
-            <p:ph idx="1"/>
-          </p:nvPr>
-        </p:nvPicPr>
-        <p:blipFill>
-          <a:blip r:embed="rId2">
-            <a:extLst>
-              <a:ext uri="{28A0092B-C50C-407E-A947-70E740481C1C}">
-                <a14:useLocalDpi xmlns:a14="http://schemas.microsoft.com/office/drawing/2010/main" val="0"/>
-              </a:ext>
-            </a:extLst>
-          </a:blip>
-          <a:srcRect t="2593" b="2593"/>
-          <a:stretch>
-            <a:fillRect/>
-          </a:stretch>
-        </p:blipFill>
-        <p:spPr/>
-      </p:pic>
-    </p:spTree>
-    <p:extLst>
-      <p:ext uri="{BB962C8B-B14F-4D97-AF65-F5344CB8AC3E}">
-        <p14:creationId xmlns:p14="http://schemas.microsoft.com/office/powerpoint/2010/main" val="11374907"/>
-      </p:ext>
-    </p:extLst>
-  </p:cSld>
-  <p:clrMapOvr>
-    <a:masterClrMapping/>
-  </p:clrMapOvr>
-</p:sld>
-</file>
-
 <file path=ppt/slides/slide5.xml><?xml version="1.0" encoding="utf-8"?>
 <p:sld xmlns:a="http://schemas.openxmlformats.org/drawingml/2006/main" xmlns:r="http://schemas.openxmlformats.org/officeDocument/2006/relationships" xmlns:p="http://schemas.openxmlformats.org/presentationml/2006/main">
   <p:cSld>
@@ -4024,88 +4026,41 @@
           <a:p>
             <a:r>
               <a:rPr lang="en-US" dirty="0" smtClean="0"/>
-              <a:t>FRONT END</a:t>
+              <a:t>WIREFRAMES: Brands Page</a:t>
             </a:r>
             <a:endParaRPr lang="en-US" dirty="0"/>
           </a:p>
         </p:txBody>
       </p:sp>
-      <p:sp>
-        <p:nvSpPr>
-          <p:cNvPr id="3" name="Content Placeholder 2"/>
-          <p:cNvSpPr>
-            <a:spLocks noGrp="1"/>
-          </p:cNvSpPr>
+      <p:pic>
+        <p:nvPicPr>
+          <p:cNvPr id="4" name="Content Placeholder 3" descr="Sneakerhub_WireframeBrands.pdf"/>
+          <p:cNvPicPr>
+            <a:picLocks noGrp="1" noChangeAspect="1"/>
+          </p:cNvPicPr>
           <p:nvPr>
             <p:ph idx="1"/>
           </p:nvPr>
-        </p:nvSpPr>
-        <p:spPr/>
-        <p:txBody>
-          <a:bodyPr/>
-          <a:lstStyle/>
-          <a:p>
-            <a:r>
-              <a:rPr lang="en-US" dirty="0" smtClean="0">
-                <a:latin typeface="Avenir Light"/>
-                <a:cs typeface="Avenir Light"/>
-              </a:rPr>
-              <a:t>HTML</a:t>
-            </a:r>
-          </a:p>
-          <a:p>
-            <a:r>
-              <a:rPr lang="en-US" dirty="0" smtClean="0">
-                <a:latin typeface="Avenir Light"/>
-                <a:cs typeface="Avenir Light"/>
-              </a:rPr>
-              <a:t>CSS</a:t>
-            </a:r>
-          </a:p>
-          <a:p>
-            <a:r>
-              <a:rPr lang="en-US" dirty="0" smtClean="0">
-                <a:latin typeface="Avenir Light"/>
-                <a:cs typeface="Avenir Light"/>
-              </a:rPr>
-              <a:t>Materialize</a:t>
-            </a:r>
-          </a:p>
-          <a:p>
-            <a:r>
-              <a:rPr lang="en-US" dirty="0" err="1" smtClean="0">
-                <a:latin typeface="Avenir Light"/>
-                <a:cs typeface="Avenir Light"/>
-              </a:rPr>
-              <a:t>App.js</a:t>
-            </a:r>
-            <a:endParaRPr lang="en-US" dirty="0" smtClean="0">
-              <a:latin typeface="Avenir Light"/>
-              <a:cs typeface="Avenir Light"/>
-            </a:endParaRPr>
-          </a:p>
-          <a:p>
-            <a:r>
-              <a:rPr lang="en-US" dirty="0" err="1" smtClean="0">
-                <a:latin typeface="Avenir Light"/>
-                <a:cs typeface="Avenir Light"/>
-              </a:rPr>
-              <a:t>Appsource.js</a:t>
-            </a:r>
-            <a:endParaRPr lang="en-US" dirty="0" smtClean="0">
-              <a:latin typeface="Avenir Light"/>
-              <a:cs typeface="Avenir Light"/>
-            </a:endParaRPr>
-          </a:p>
-          <a:p>
-            <a:endParaRPr lang="en-US" dirty="0"/>
-          </a:p>
-        </p:txBody>
-      </p:sp>
+        </p:nvPicPr>
+        <p:blipFill>
+          <a:blip r:embed="rId2">
+            <a:extLst>
+              <a:ext uri="{28A0092B-C50C-407E-A947-70E740481C1C}">
+                <a14:useLocalDpi xmlns:a14="http://schemas.microsoft.com/office/drawing/2010/main" val="0"/>
+              </a:ext>
+            </a:extLst>
+          </a:blip>
+          <a:srcRect t="2593" b="2593"/>
+          <a:stretch>
+            <a:fillRect/>
+          </a:stretch>
+        </p:blipFill>
+        <p:spPr/>
+      </p:pic>
     </p:spTree>
     <p:extLst>
       <p:ext uri="{BB962C8B-B14F-4D97-AF65-F5344CB8AC3E}">
-        <p14:creationId xmlns:p14="http://schemas.microsoft.com/office/powerpoint/2010/main" val="2319988855"/>
+        <p14:creationId xmlns:p14="http://schemas.microsoft.com/office/powerpoint/2010/main" val="11374907"/>
       </p:ext>
     </p:extLst>
   </p:cSld>
@@ -4149,6 +4104,131 @@
           <a:p>
             <a:r>
               <a:rPr lang="en-US" dirty="0" smtClean="0"/>
+              <a:t>FRONT END</a:t>
+            </a:r>
+            <a:endParaRPr lang="en-US" dirty="0"/>
+          </a:p>
+        </p:txBody>
+      </p:sp>
+      <p:sp>
+        <p:nvSpPr>
+          <p:cNvPr id="3" name="Content Placeholder 2"/>
+          <p:cNvSpPr>
+            <a:spLocks noGrp="1"/>
+          </p:cNvSpPr>
+          <p:nvPr>
+            <p:ph idx="1"/>
+          </p:nvPr>
+        </p:nvSpPr>
+        <p:spPr/>
+        <p:txBody>
+          <a:bodyPr/>
+          <a:lstStyle/>
+          <a:p>
+            <a:r>
+              <a:rPr lang="en-US" dirty="0" smtClean="0">
+                <a:latin typeface="Avenir Light"/>
+                <a:cs typeface="Avenir Light"/>
+              </a:rPr>
+              <a:t>HTML</a:t>
+            </a:r>
+          </a:p>
+          <a:p>
+            <a:r>
+              <a:rPr lang="en-US" dirty="0" smtClean="0">
+                <a:latin typeface="Avenir Light"/>
+                <a:cs typeface="Avenir Light"/>
+              </a:rPr>
+              <a:t>CSS</a:t>
+            </a:r>
+          </a:p>
+          <a:p>
+            <a:r>
+              <a:rPr lang="en-US" dirty="0" smtClean="0">
+                <a:latin typeface="Avenir Light"/>
+                <a:cs typeface="Avenir Light"/>
+              </a:rPr>
+              <a:t>Materialize</a:t>
+            </a:r>
+          </a:p>
+          <a:p>
+            <a:r>
+              <a:rPr lang="en-US" dirty="0" err="1" smtClean="0">
+                <a:latin typeface="Avenir Light"/>
+                <a:cs typeface="Avenir Light"/>
+              </a:rPr>
+              <a:t>App.js</a:t>
+            </a:r>
+            <a:endParaRPr lang="en-US" dirty="0" smtClean="0">
+              <a:latin typeface="Avenir Light"/>
+              <a:cs typeface="Avenir Light"/>
+            </a:endParaRPr>
+          </a:p>
+          <a:p>
+            <a:r>
+              <a:rPr lang="en-US" dirty="0" err="1" smtClean="0">
+                <a:latin typeface="Avenir Light"/>
+                <a:cs typeface="Avenir Light"/>
+              </a:rPr>
+              <a:t>Appsource.js</a:t>
+            </a:r>
+            <a:endParaRPr lang="en-US" dirty="0" smtClean="0">
+              <a:latin typeface="Avenir Light"/>
+              <a:cs typeface="Avenir Light"/>
+            </a:endParaRPr>
+          </a:p>
+          <a:p>
+            <a:endParaRPr lang="en-US" dirty="0"/>
+          </a:p>
+        </p:txBody>
+      </p:sp>
+    </p:spTree>
+    <p:extLst>
+      <p:ext uri="{BB962C8B-B14F-4D97-AF65-F5344CB8AC3E}">
+        <p14:creationId xmlns:p14="http://schemas.microsoft.com/office/powerpoint/2010/main" val="2319988855"/>
+      </p:ext>
+    </p:extLst>
+  </p:cSld>
+  <p:clrMapOvr>
+    <a:masterClrMapping/>
+  </p:clrMapOvr>
+</p:sld>
+</file>
+
+<file path=ppt/slides/slide7.xml><?xml version="1.0" encoding="utf-8"?>
+<p:sld xmlns:a="http://schemas.openxmlformats.org/drawingml/2006/main" xmlns:r="http://schemas.openxmlformats.org/officeDocument/2006/relationships" xmlns:p="http://schemas.openxmlformats.org/presentationml/2006/main">
+  <p:cSld>
+    <p:spTree>
+      <p:nvGrpSpPr>
+        <p:cNvPr id="1" name=""/>
+        <p:cNvGrpSpPr/>
+        <p:nvPr/>
+      </p:nvGrpSpPr>
+      <p:grpSpPr>
+        <a:xfrm>
+          <a:off x="0" y="0"/>
+          <a:ext cx="0" cy="0"/>
+          <a:chOff x="0" y="0"/>
+          <a:chExt cx="0" cy="0"/>
+        </a:xfrm>
+      </p:grpSpPr>
+      <p:sp>
+        <p:nvSpPr>
+          <p:cNvPr id="2" name="Title 1"/>
+          <p:cNvSpPr>
+            <a:spLocks noGrp="1"/>
+          </p:cNvSpPr>
+          <p:nvPr>
+            <p:ph type="title"/>
+          </p:nvPr>
+        </p:nvSpPr>
+        <p:spPr/>
+        <p:txBody>
+          <a:bodyPr/>
+          <a:lstStyle/>
+          <a:p>
+            <a:r>
+              <a:rPr lang="en-US" dirty="0" smtClean="0"/>
               <a:t>BACK END</a:t>
             </a:r>
             <a:endParaRPr lang="en-US" dirty="0"/>
@@ -4263,7 +4343,7 @@
 </p:sld>
 </file>
 
-<file path=ppt/slides/slide7.xml><?xml version="1.0" encoding="utf-8"?>
+<file path=ppt/slides/slide8.xml><?xml version="1.0" encoding="utf-8"?>
 <p:sld xmlns:a="http://schemas.openxmlformats.org/drawingml/2006/main" xmlns:r="http://schemas.openxmlformats.org/officeDocument/2006/relationships" xmlns:p="http://schemas.openxmlformats.org/presentationml/2006/main">
   <p:cSld>
     <p:spTree>

</xml_diff>